<commit_message>
Add Martin's voice to presentation
</commit_message>
<xml_diff>
--- a/Documents/Presentation/Untitled-Presentation.pptx
+++ b/Documents/Presentation/Untitled-Presentation.pptx
@@ -9803,6 +9803,44 @@
           </a:p>
         </p:txBody>
       </p:sp>
+      <p:pic>
+        <p:nvPicPr>
+          <p:cNvPr id="2" name="Аудио 1">
+            <a:hlinkClick r:id="" action="ppaction://media"/>
+            <a:extLst>
+              <a:ext uri="{FF2B5EF4-FFF2-40B4-BE49-F238E27FC236}">
+                <a16:creationId xmlns:a16="http://schemas.microsoft.com/office/drawing/2014/main" id="{49CA8095-4B47-4000-B475-2DB25635DBC7}"/>
+              </a:ext>
+            </a:extLst>
+          </p:cNvPr>
+          <p:cNvPicPr>
+            <a:picLocks noChangeAspect="1"/>
+          </p:cNvPicPr>
+          <p:nvPr>
+            <a:audioFile r:link="rId2"/>
+            <p:extLst>
+              <p:ext uri="{DAA4B4D4-6D71-4841-9C94-3DE7FCFB9230}">
+                <p14:media xmlns:p14="http://schemas.microsoft.com/office/powerpoint/2010/main" r:embed="rId1"/>
+              </p:ext>
+            </p:extLst>
+          </p:nvPr>
+        </p:nvPicPr>
+        <p:blipFill>
+          <a:blip r:embed="rId5"/>
+          <a:stretch>
+            <a:fillRect/>
+          </a:stretch>
+        </p:blipFill>
+        <p:spPr>
+          <a:xfrm>
+            <a:off x="8318500" y="4318000"/>
+            <a:ext cx="609600" cy="609600"/>
+          </a:xfrm>
+          <a:prstGeom prst="rect">
+            <a:avLst/>
+          </a:prstGeom>
+        </p:spPr>
+      </p:pic>
     </p:spTree>
   </p:cSld>
   <p:clrMapOvr>
@@ -9810,16 +9848,103 @@
   </p:clrMapOvr>
   <mc:AlternateContent xmlns:mc="http://schemas.openxmlformats.org/markup-compatibility/2006">
     <mc:Choice xmlns:p14="http://schemas.microsoft.com/office/powerpoint/2010/main" Requires="p14">
-      <p:transition spd="med" p14:dur="700">
+      <p:transition spd="med" p14:dur="700" advTm="6401">
         <p:fade/>
       </p:transition>
     </mc:Choice>
     <mc:Fallback>
-      <p:transition spd="med">
+      <p:transition spd="med" advTm="6401">
         <p:fade/>
       </p:transition>
     </mc:Fallback>
   </mc:AlternateContent>
+  <p:timing>
+    <p:tnLst>
+      <p:par>
+        <p:cTn id="1" dur="indefinite" restart="never" nodeType="tmRoot">
+          <p:childTnLst>
+            <p:seq concurrent="1" nextAc="seek">
+              <p:cTn id="2" dur="indefinite" nodeType="mainSeq">
+                <p:childTnLst>
+                  <p:par>
+                    <p:cTn id="3" fill="hold">
+                      <p:stCondLst>
+                        <p:cond delay="indefinite"/>
+                        <p:cond evt="onBegin" delay="0">
+                          <p:tn val="2"/>
+                        </p:cond>
+                      </p:stCondLst>
+                      <p:childTnLst>
+                        <p:par>
+                          <p:cTn id="4" fill="hold">
+                            <p:stCondLst>
+                              <p:cond delay="0"/>
+                            </p:stCondLst>
+                            <p:childTnLst>
+                              <p:par>
+                                <p:cTn id="5" presetID="1" presetClass="mediacall" presetSubtype="0" fill="hold" nodeType="afterEffect">
+                                  <p:stCondLst>
+                                    <p:cond delay="0"/>
+                                  </p:stCondLst>
+                                  <p:childTnLst>
+                                    <p:cmd type="call" cmd="playFrom(0.0)">
+                                      <p:cBhvr>
+                                        <p:cTn id="6" dur="1" fill="hold"/>
+                                        <p:tgtEl>
+                                          <p:spTgt spid="2"/>
+                                        </p:tgtEl>
+                                      </p:cBhvr>
+                                    </p:cmd>
+                                  </p:childTnLst>
+                                </p:cTn>
+                              </p:par>
+                            </p:childTnLst>
+                          </p:cTn>
+                        </p:par>
+                      </p:childTnLst>
+                    </p:cTn>
+                  </p:par>
+                </p:childTnLst>
+              </p:cTn>
+              <p:prevCondLst>
+                <p:cond evt="onPrev" delay="0">
+                  <p:tgtEl>
+                    <p:sldTgt/>
+                  </p:tgtEl>
+                </p:cond>
+              </p:prevCondLst>
+              <p:nextCondLst>
+                <p:cond evt="onNext" delay="0">
+                  <p:tgtEl>
+                    <p:sldTgt/>
+                  </p:tgtEl>
+                </p:cond>
+              </p:nextCondLst>
+            </p:seq>
+            <p:audio isNarration="1">
+              <p:cMediaNode vol="80000" showWhenStopped="0">
+                <p:cTn id="7" fill="hold" display="0">
+                  <p:stCondLst>
+                    <p:cond delay="indefinite"/>
+                  </p:stCondLst>
+                  <p:endCondLst>
+                    <p:cond evt="onStopAudio" delay="0">
+                      <p:tgtEl>
+                        <p:sldTgt/>
+                      </p:tgtEl>
+                    </p:cond>
+                  </p:endCondLst>
+                </p:cTn>
+                <p:tgtEl>
+                  <p:spTgt spid="2"/>
+                </p:tgtEl>
+              </p:cMediaNode>
+            </p:audio>
+          </p:childTnLst>
+        </p:cTn>
+      </p:par>
+    </p:tnLst>
+  </p:timing>
 </p:sld>
 </file>
 
@@ -10239,11 +10364,139 @@
           </a:p>
         </p:txBody>
       </p:sp>
+      <p:pic>
+        <p:nvPicPr>
+          <p:cNvPr id="6" name="Аудио 5">
+            <a:hlinkClick r:id="" action="ppaction://media"/>
+            <a:extLst>
+              <a:ext uri="{FF2B5EF4-FFF2-40B4-BE49-F238E27FC236}">
+                <a16:creationId xmlns:a16="http://schemas.microsoft.com/office/drawing/2014/main" id="{DF3A0773-F97B-48F2-8667-2B2928824089}"/>
+              </a:ext>
+            </a:extLst>
+          </p:cNvPr>
+          <p:cNvPicPr>
+            <a:picLocks noChangeAspect="1"/>
+          </p:cNvPicPr>
+          <p:nvPr>
+            <a:audioFile r:link="rId2"/>
+            <p:extLst>
+              <p:ext uri="{DAA4B4D4-6D71-4841-9C94-3DE7FCFB9230}">
+                <p14:media xmlns:p14="http://schemas.microsoft.com/office/powerpoint/2010/main" r:embed="rId1"/>
+              </p:ext>
+            </p:extLst>
+          </p:nvPr>
+        </p:nvPicPr>
+        <p:blipFill>
+          <a:blip r:embed="rId5"/>
+          <a:stretch>
+            <a:fillRect/>
+          </a:stretch>
+        </p:blipFill>
+        <p:spPr>
+          <a:xfrm>
+            <a:off x="8318500" y="4318000"/>
+            <a:ext cx="609600" cy="609600"/>
+          </a:xfrm>
+          <a:prstGeom prst="rect">
+            <a:avLst/>
+          </a:prstGeom>
+        </p:spPr>
+      </p:pic>
     </p:spTree>
   </p:cSld>
   <p:clrMapOvr>
     <a:masterClrMapping/>
   </p:clrMapOvr>
+  <p:transition advTm="13154">
+    <p:fade thruBlk="1"/>
+  </p:transition>
+  <p:timing>
+    <p:tnLst>
+      <p:par>
+        <p:cTn id="1" dur="indefinite" restart="never" nodeType="tmRoot">
+          <p:childTnLst>
+            <p:seq concurrent="1" nextAc="seek">
+              <p:cTn id="2" dur="indefinite" nodeType="mainSeq">
+                <p:childTnLst>
+                  <p:par>
+                    <p:cTn id="3" fill="hold">
+                      <p:stCondLst>
+                        <p:cond delay="indefinite"/>
+                        <p:cond evt="onBegin" delay="0">
+                          <p:tn val="2"/>
+                        </p:cond>
+                      </p:stCondLst>
+                      <p:childTnLst>
+                        <p:par>
+                          <p:cTn id="4" fill="hold">
+                            <p:stCondLst>
+                              <p:cond delay="0"/>
+                            </p:stCondLst>
+                            <p:childTnLst>
+                              <p:par>
+                                <p:cTn id="5" presetID="1" presetClass="mediacall" presetSubtype="0" fill="hold" nodeType="afterEffect">
+                                  <p:stCondLst>
+                                    <p:cond delay="0"/>
+                                  </p:stCondLst>
+                                  <p:childTnLst>
+                                    <p:cmd type="call" cmd="playFrom(0.0)">
+                                      <p:cBhvr>
+                                        <p:cTn id="6" dur="1" fill="hold"/>
+                                        <p:tgtEl>
+                                          <p:spTgt spid="6"/>
+                                        </p:tgtEl>
+                                      </p:cBhvr>
+                                    </p:cmd>
+                                  </p:childTnLst>
+                                </p:cTn>
+                              </p:par>
+                            </p:childTnLst>
+                          </p:cTn>
+                        </p:par>
+                      </p:childTnLst>
+                    </p:cTn>
+                  </p:par>
+                </p:childTnLst>
+              </p:cTn>
+              <p:prevCondLst>
+                <p:cond evt="onPrev" delay="0">
+                  <p:tgtEl>
+                    <p:sldTgt/>
+                  </p:tgtEl>
+                </p:cond>
+              </p:prevCondLst>
+              <p:nextCondLst>
+                <p:cond evt="onNext" delay="0">
+                  <p:tgtEl>
+                    <p:sldTgt/>
+                  </p:tgtEl>
+                </p:cond>
+              </p:nextCondLst>
+            </p:seq>
+            <p:audio isNarration="1">
+              <p:cMediaNode vol="80000" showWhenStopped="0">
+                <p:cTn id="7" fill="hold" display="0">
+                  <p:stCondLst>
+                    <p:cond delay="indefinite"/>
+                  </p:stCondLst>
+                  <p:endCondLst>
+                    <p:cond evt="onStopAudio" delay="0">
+                      <p:tgtEl>
+                        <p:sldTgt/>
+                      </p:tgtEl>
+                    </p:cond>
+                  </p:endCondLst>
+                </p:cTn>
+                <p:tgtEl>
+                  <p:spTgt spid="6"/>
+                </p:tgtEl>
+              </p:cMediaNode>
+            </p:audio>
+          </p:childTnLst>
+        </p:cTn>
+      </p:par>
+    </p:tnLst>
+  </p:timing>
 </p:sld>
 </file>
 
@@ -14679,7 +14932,7 @@
     <p:bg>
       <p:bgPr>
         <a:blipFill>
-          <a:blip r:embed="rId3">
+          <a:blip r:embed="rId5">
             <a:alphaModFix/>
           </a:blip>
           <a:stretch>
@@ -15104,11 +15357,139 @@
           </a:p>
         </p:txBody>
       </p:sp>
+      <p:pic>
+        <p:nvPicPr>
+          <p:cNvPr id="2" name="Аудио 1">
+            <a:hlinkClick r:id="" action="ppaction://media"/>
+            <a:extLst>
+              <a:ext uri="{FF2B5EF4-FFF2-40B4-BE49-F238E27FC236}">
+                <a16:creationId xmlns:a16="http://schemas.microsoft.com/office/drawing/2014/main" id="{5DB44DFF-64D0-4904-BEB4-D855943C0952}"/>
+              </a:ext>
+            </a:extLst>
+          </p:cNvPr>
+          <p:cNvPicPr>
+            <a:picLocks noChangeAspect="1"/>
+          </p:cNvPicPr>
+          <p:nvPr>
+            <a:audioFile r:link="rId2"/>
+            <p:extLst>
+              <p:ext uri="{DAA4B4D4-6D71-4841-9C94-3DE7FCFB9230}">
+                <p14:media xmlns:p14="http://schemas.microsoft.com/office/powerpoint/2010/main" r:embed="rId1"/>
+              </p:ext>
+            </p:extLst>
+          </p:nvPr>
+        </p:nvPicPr>
+        <p:blipFill>
+          <a:blip r:embed="rId6"/>
+          <a:stretch>
+            <a:fillRect/>
+          </a:stretch>
+        </p:blipFill>
+        <p:spPr>
+          <a:xfrm>
+            <a:off x="8318500" y="4318000"/>
+            <a:ext cx="609600" cy="609600"/>
+          </a:xfrm>
+          <a:prstGeom prst="rect">
+            <a:avLst/>
+          </a:prstGeom>
+        </p:spPr>
+      </p:pic>
     </p:spTree>
   </p:cSld>
   <p:clrMapOvr>
     <a:masterClrMapping/>
   </p:clrMapOvr>
+  <p:transition advTm="5114">
+    <p:fade thruBlk="1"/>
+  </p:transition>
+  <p:timing>
+    <p:tnLst>
+      <p:par>
+        <p:cTn id="1" dur="indefinite" restart="never" nodeType="tmRoot">
+          <p:childTnLst>
+            <p:seq concurrent="1" nextAc="seek">
+              <p:cTn id="2" dur="indefinite" nodeType="mainSeq">
+                <p:childTnLst>
+                  <p:par>
+                    <p:cTn id="3" fill="hold">
+                      <p:stCondLst>
+                        <p:cond delay="indefinite"/>
+                        <p:cond evt="onBegin" delay="0">
+                          <p:tn val="2"/>
+                        </p:cond>
+                      </p:stCondLst>
+                      <p:childTnLst>
+                        <p:par>
+                          <p:cTn id="4" fill="hold">
+                            <p:stCondLst>
+                              <p:cond delay="0"/>
+                            </p:stCondLst>
+                            <p:childTnLst>
+                              <p:par>
+                                <p:cTn id="5" presetID="1" presetClass="mediacall" presetSubtype="0" fill="hold" nodeType="afterEffect">
+                                  <p:stCondLst>
+                                    <p:cond delay="0"/>
+                                  </p:stCondLst>
+                                  <p:childTnLst>
+                                    <p:cmd type="call" cmd="playFrom(0.0)">
+                                      <p:cBhvr>
+                                        <p:cTn id="6" dur="1" fill="hold"/>
+                                        <p:tgtEl>
+                                          <p:spTgt spid="2"/>
+                                        </p:tgtEl>
+                                      </p:cBhvr>
+                                    </p:cmd>
+                                  </p:childTnLst>
+                                </p:cTn>
+                              </p:par>
+                            </p:childTnLst>
+                          </p:cTn>
+                        </p:par>
+                      </p:childTnLst>
+                    </p:cTn>
+                  </p:par>
+                </p:childTnLst>
+              </p:cTn>
+              <p:prevCondLst>
+                <p:cond evt="onPrev" delay="0">
+                  <p:tgtEl>
+                    <p:sldTgt/>
+                  </p:tgtEl>
+                </p:cond>
+              </p:prevCondLst>
+              <p:nextCondLst>
+                <p:cond evt="onNext" delay="0">
+                  <p:tgtEl>
+                    <p:sldTgt/>
+                  </p:tgtEl>
+                </p:cond>
+              </p:nextCondLst>
+            </p:seq>
+            <p:audio isNarration="1">
+              <p:cMediaNode vol="80000" showWhenStopped="0">
+                <p:cTn id="7" fill="hold" display="0">
+                  <p:stCondLst>
+                    <p:cond delay="indefinite"/>
+                  </p:stCondLst>
+                  <p:endCondLst>
+                    <p:cond evt="onStopAudio" delay="0">
+                      <p:tgtEl>
+                        <p:sldTgt/>
+                      </p:tgtEl>
+                    </p:cond>
+                  </p:endCondLst>
+                </p:cTn>
+                <p:tgtEl>
+                  <p:spTgt spid="2"/>
+                </p:tgtEl>
+              </p:cMediaNode>
+            </p:audio>
+          </p:childTnLst>
+        </p:cTn>
+      </p:par>
+    </p:tnLst>
+  </p:timing>
 </p:sld>
 </file>
 

</xml_diff>

<commit_message>
Add Hristo's voice to presentation
</commit_message>
<xml_diff>
--- a/Documents/Presentation/Untitled-Presentation.pptx
+++ b/Documents/Presentation/Untitled-Presentation.pptx
@@ -9846,13 +9846,13 @@
   <p:clrMapOvr>
     <a:masterClrMapping/>
   </p:clrMapOvr>
-  <mc:AlternateContent xmlns:mc="http://schemas.openxmlformats.org/markup-compatibility/2006">
-    <mc:Choice xmlns:p14="http://schemas.microsoft.com/office/powerpoint/2010/main" Requires="p14">
+  <mc:AlternateContent xmlns:mc="http://schemas.openxmlformats.org/markup-compatibility/2006" xmlns:p14="http://schemas.microsoft.com/office/powerpoint/2010/main">
+    <mc:Choice Requires="p14">
       <p:transition spd="med" p14:dur="700" advTm="6401">
         <p:fade/>
       </p:transition>
     </mc:Choice>
-    <mc:Fallback>
+    <mc:Fallback xmlns="">
       <p:transition spd="med" advTm="6401">
         <p:fade/>
       </p:transition>
@@ -10064,6 +10064,15 @@
               </a:rPr>
               <a:t>Maria Ilcheva</a:t>
             </a:r>
+            <a:r>
+              <a:rPr lang="en" sz="1800" dirty="0">
+                <a:latin typeface="Saira Semi Condensed"/>
+                <a:ea typeface="Saira Semi Condensed"/>
+                <a:cs typeface="Saira Semi Condensed"/>
+                <a:sym typeface="Saira Semi Condensed"/>
+              </a:rPr>
+              <a:t/>
+            </a:r>
             <a:br>
               <a:rPr lang="en" sz="1800" dirty="0">
                 <a:latin typeface="Saira Semi Condensed"/>
@@ -10150,6 +10159,15 @@
               </a:rPr>
               <a:t>Vanina Teneva</a:t>
             </a:r>
+            <a:r>
+              <a:rPr lang="en" sz="1800" dirty="0">
+                <a:latin typeface="Saira Semi Condensed"/>
+                <a:ea typeface="Saira Semi Condensed"/>
+                <a:cs typeface="Saira Semi Condensed"/>
+                <a:sym typeface="Saira Semi Condensed"/>
+              </a:rPr>
+              <a:t/>
+            </a:r>
             <a:br>
               <a:rPr lang="en" sz="1800" dirty="0">
                 <a:latin typeface="Saira Semi Condensed"/>
@@ -10235,6 +10253,15 @@
                 <a:sym typeface="Saira Semi Condensed"/>
               </a:rPr>
               <a:t>Martin Mechkov</a:t>
+            </a:r>
+            <a:r>
+              <a:rPr lang="en" sz="1800" dirty="0">
+                <a:latin typeface="Saira Semi Condensed"/>
+                <a:ea typeface="Saira Semi Condensed"/>
+                <a:cs typeface="Saira Semi Condensed"/>
+                <a:sym typeface="Saira Semi Condensed"/>
+              </a:rPr>
+              <a:t/>
             </a:r>
             <a:br>
               <a:rPr lang="en" sz="1800" dirty="0">
@@ -14273,6 +14300,13 @@
   <p:clrMapOvr>
     <a:masterClrMapping/>
   </p:clrMapOvr>
+  <p:timing>
+    <p:tnLst>
+      <p:par>
+        <p:cTn id="1" dur="indefinite" restart="never" nodeType="tmRoot"/>
+      </p:par>
+    </p:tnLst>
+  </p:timing>
 </p:sld>
 </file>
 
@@ -14683,7 +14717,7 @@
           <p:nvPr/>
         </p:nvPicPr>
         <p:blipFill>
-          <a:blip r:embed="rId3">
+          <a:blip r:embed="rId5">
             <a:lum bright="70000" contrast="-70000"/>
             <a:extLst>
               <a:ext uri="{28A0092B-C50C-407E-A947-70E740481C1C}">
@@ -14731,7 +14765,7 @@
           <p:nvPr/>
         </p:nvPicPr>
         <p:blipFill>
-          <a:blip r:embed="rId4">
+          <a:blip r:embed="rId6">
             <a:lum bright="70000" contrast="-70000"/>
             <a:extLst>
               <a:ext uri="{28A0092B-C50C-407E-A947-70E740481C1C}">
@@ -14779,7 +14813,7 @@
           <p:nvPr/>
         </p:nvPicPr>
         <p:blipFill>
-          <a:blip r:embed="rId5">
+          <a:blip r:embed="rId7">
             <a:lum bright="70000" contrast="-70000"/>
             <a:extLst>
               <a:ext uri="{28A0092B-C50C-407E-A947-70E740481C1C}">
@@ -14827,7 +14861,7 @@
           <p:nvPr/>
         </p:nvPicPr>
         <p:blipFill>
-          <a:blip r:embed="rId6">
+          <a:blip r:embed="rId8">
             <a:lum bright="70000" contrast="-70000"/>
             <a:extLst>
               <a:ext uri="{28A0092B-C50C-407E-A947-70E740481C1C}">
@@ -14875,7 +14909,7 @@
           <p:nvPr/>
         </p:nvPicPr>
         <p:blipFill>
-          <a:blip r:embed="rId7">
+          <a:blip r:embed="rId9">
             <a:clrChange>
               <a:clrFrom>
                 <a:srgbClr val="F7F7F7"/>
@@ -14918,11 +14952,131 @@
           </a:extLst>
         </p:spPr>
       </p:pic>
+      <p:pic>
+        <p:nvPicPr>
+          <p:cNvPr id="2" name="2021-11-07 20-25-50">
+            <a:hlinkClick r:id="" action="ppaction://media"/>
+          </p:cNvPr>
+          <p:cNvPicPr>
+            <a:picLocks noChangeAspect="1"/>
+          </p:cNvPicPr>
+          <p:nvPr>
+            <a:audioFile r:link="rId2"/>
+            <p:extLst>
+              <p:ext uri="{DAA4B4D4-6D71-4841-9C94-3DE7FCFB9230}">
+                <p14:media xmlns:p14="http://schemas.microsoft.com/office/powerpoint/2010/main" r:embed="rId1"/>
+              </p:ext>
+            </p:extLst>
+          </p:nvPr>
+        </p:nvPicPr>
+        <p:blipFill>
+          <a:blip r:embed="rId10"/>
+          <a:stretch>
+            <a:fillRect/>
+          </a:stretch>
+        </p:blipFill>
+        <p:spPr>
+          <a:xfrm>
+            <a:off x="8343577" y="4260850"/>
+            <a:ext cx="609600" cy="609600"/>
+          </a:xfrm>
+          <a:prstGeom prst="rect">
+            <a:avLst/>
+          </a:prstGeom>
+        </p:spPr>
+      </p:pic>
     </p:spTree>
   </p:cSld>
   <p:clrMapOvr>
     <a:masterClrMapping/>
   </p:clrMapOvr>
+  <p:timing>
+    <p:tnLst>
+      <p:par>
+        <p:cTn id="1" dur="indefinite" restart="never" nodeType="tmRoot">
+          <p:childTnLst>
+            <p:seq concurrent="1" nextAc="seek">
+              <p:cTn id="2" dur="indefinite" nodeType="mainSeq">
+                <p:childTnLst>
+                  <p:par>
+                    <p:cTn id="3" fill="hold">
+                      <p:stCondLst>
+                        <p:cond delay="indefinite"/>
+                        <p:cond evt="onBegin" delay="0">
+                          <p:tn val="2"/>
+                        </p:cond>
+                      </p:stCondLst>
+                      <p:childTnLst>
+                        <p:par>
+                          <p:cTn id="4" fill="hold">
+                            <p:stCondLst>
+                              <p:cond delay="0"/>
+                            </p:stCondLst>
+                            <p:childTnLst>
+                              <p:par>
+                                <p:cTn id="5" presetID="1" presetClass="mediacall" presetSubtype="0" fill="hold" nodeType="afterEffect">
+                                  <p:stCondLst>
+                                    <p:cond delay="0"/>
+                                  </p:stCondLst>
+                                  <p:childTnLst>
+                                    <p:cmd type="call" cmd="playFrom(0.0)">
+                                      <p:cBhvr>
+                                        <p:cTn id="6" dur="1" fill="hold"/>
+                                        <p:tgtEl>
+                                          <p:spTgt spid="2"/>
+                                        </p:tgtEl>
+                                      </p:cBhvr>
+                                    </p:cmd>
+                                  </p:childTnLst>
+                                </p:cTn>
+                              </p:par>
+                            </p:childTnLst>
+                          </p:cTn>
+                        </p:par>
+                      </p:childTnLst>
+                    </p:cTn>
+                  </p:par>
+                </p:childTnLst>
+              </p:cTn>
+              <p:prevCondLst>
+                <p:cond evt="onPrev" delay="0">
+                  <p:tgtEl>
+                    <p:sldTgt/>
+                  </p:tgtEl>
+                </p:cond>
+              </p:prevCondLst>
+              <p:nextCondLst>
+                <p:cond evt="onNext" delay="0">
+                  <p:tgtEl>
+                    <p:sldTgt/>
+                  </p:tgtEl>
+                </p:cond>
+              </p:nextCondLst>
+            </p:seq>
+            <p:audio>
+              <p:cMediaNode vol="80000" numSld="999" showWhenStopped="0">
+                <p:cTn id="7" repeatCount="indefinite" fill="hold" display="0">
+                  <p:stCondLst>
+                    <p:cond delay="indefinite"/>
+                  </p:stCondLst>
+                  <p:endCondLst>
+                    <p:cond evt="onStopAudio" delay="0">
+                      <p:tgtEl>
+                        <p:sldTgt/>
+                      </p:tgtEl>
+                    </p:cond>
+                  </p:endCondLst>
+                </p:cTn>
+                <p:tgtEl>
+                  <p:spTgt spid="2"/>
+                </p:tgtEl>
+              </p:cMediaNode>
+            </p:audio>
+          </p:childTnLst>
+        </p:cTn>
+      </p:par>
+    </p:tnLst>
+  </p:timing>
 </p:sld>
 </file>
 

</xml_diff>

<commit_message>
Add Vanina's audio to the presentation
</commit_message>
<xml_diff>
--- a/Documents/Presentation/Untitled-Presentation.pptx
+++ b/Documents/Presentation/Untitled-Presentation.pptx
@@ -10064,15 +10064,6 @@
               </a:rPr>
               <a:t>Maria Ilcheva</a:t>
             </a:r>
-            <a:r>
-              <a:rPr lang="en" sz="1800" dirty="0">
-                <a:latin typeface="Saira Semi Condensed"/>
-                <a:ea typeface="Saira Semi Condensed"/>
-                <a:cs typeface="Saira Semi Condensed"/>
-                <a:sym typeface="Saira Semi Condensed"/>
-              </a:rPr>
-              <a:t/>
-            </a:r>
             <a:br>
               <a:rPr lang="en" sz="1800" dirty="0">
                 <a:latin typeface="Saira Semi Condensed"/>
@@ -10159,15 +10150,6 @@
               </a:rPr>
               <a:t>Vanina Teneva</a:t>
             </a:r>
-            <a:r>
-              <a:rPr lang="en" sz="1800" dirty="0">
-                <a:latin typeface="Saira Semi Condensed"/>
-                <a:ea typeface="Saira Semi Condensed"/>
-                <a:cs typeface="Saira Semi Condensed"/>
-                <a:sym typeface="Saira Semi Condensed"/>
-              </a:rPr>
-              <a:t/>
-            </a:r>
             <a:br>
               <a:rPr lang="en" sz="1800" dirty="0">
                 <a:latin typeface="Saira Semi Condensed"/>
@@ -10253,15 +10235,6 @@
                 <a:sym typeface="Saira Semi Condensed"/>
               </a:rPr>
               <a:t>Martin Mechkov</a:t>
-            </a:r>
-            <a:r>
-              <a:rPr lang="en" sz="1800" dirty="0">
-                <a:latin typeface="Saira Semi Condensed"/>
-                <a:ea typeface="Saira Semi Condensed"/>
-                <a:cs typeface="Saira Semi Condensed"/>
-                <a:sym typeface="Saira Semi Condensed"/>
-              </a:rPr>
-              <a:t/>
             </a:r>
             <a:br>
               <a:rPr lang="en" sz="1800" dirty="0">
@@ -10629,7 +10602,7 @@
           <p:nvPr/>
         </p:nvPicPr>
         <p:blipFill>
-          <a:blip r:embed="rId3">
+          <a:blip r:embed="rId5">
             <a:extLst>
               <a:ext uri="{28A0092B-C50C-407E-A947-70E740481C1C}">
                 <a14:useLocalDpi xmlns:a14="http://schemas.microsoft.com/office/drawing/2010/main" val="0"/>
@@ -10676,7 +10649,7 @@
           <p:nvPr/>
         </p:nvPicPr>
         <p:blipFill>
-          <a:blip r:embed="rId4">
+          <a:blip r:embed="rId6">
             <a:extLst>
               <a:ext uri="{28A0092B-C50C-407E-A947-70E740481C1C}">
                 <a14:useLocalDpi xmlns:a14="http://schemas.microsoft.com/office/drawing/2010/main" val="0"/>
@@ -10723,7 +10696,7 @@
           <p:nvPr/>
         </p:nvPicPr>
         <p:blipFill>
-          <a:blip r:embed="rId5">
+          <a:blip r:embed="rId7">
             <a:lum bright="70000" contrast="-70000"/>
             <a:extLst>
               <a:ext uri="{28A0092B-C50C-407E-A947-70E740481C1C}">
@@ -10771,7 +10744,7 @@
           <p:nvPr/>
         </p:nvPicPr>
         <p:blipFill>
-          <a:blip r:embed="rId6">
+          <a:blip r:embed="rId8">
             <a:extLst>
               <a:ext uri="{28A0092B-C50C-407E-A947-70E740481C1C}">
                 <a14:useLocalDpi xmlns:a14="http://schemas.microsoft.com/office/drawing/2010/main" val="0"/>
@@ -10818,7 +10791,7 @@
           <p:nvPr/>
         </p:nvPicPr>
         <p:blipFill rotWithShape="1">
-          <a:blip r:embed="rId7">
+          <a:blip r:embed="rId9">
             <a:clrChange>
               <a:clrFrom>
                 <a:srgbClr val="23262D"/>
@@ -10873,7 +10846,7 @@
           <p:nvPr/>
         </p:nvPicPr>
         <p:blipFill>
-          <a:blip r:embed="rId8">
+          <a:blip r:embed="rId10">
             <a:extLst>
               <a:ext uri="{28A0092B-C50C-407E-A947-70E740481C1C}">
                 <a14:useLocalDpi xmlns:a14="http://schemas.microsoft.com/office/drawing/2010/main" val="0"/>
@@ -10920,7 +10893,7 @@
           <p:nvPr/>
         </p:nvPicPr>
         <p:blipFill>
-          <a:blip r:embed="rId9">
+          <a:blip r:embed="rId11">
             <a:extLst>
               <a:ext uri="{28A0092B-C50C-407E-A947-70E740481C1C}">
                 <a14:useLocalDpi xmlns:a14="http://schemas.microsoft.com/office/drawing/2010/main" val="0"/>
@@ -10967,7 +10940,7 @@
           <p:nvPr/>
         </p:nvPicPr>
         <p:blipFill>
-          <a:blip r:embed="rId10">
+          <a:blip r:embed="rId12">
             <a:extLst>
               <a:ext uri="{28A0092B-C50C-407E-A947-70E740481C1C}">
                 <a14:useLocalDpi xmlns:a14="http://schemas.microsoft.com/office/drawing/2010/main" val="0"/>
@@ -11014,11 +10987,11 @@
           <p:nvPr/>
         </p:nvPicPr>
         <p:blipFill rotWithShape="1">
-          <a:blip r:embed="rId11">
+          <a:blip r:embed="rId13">
             <a:extLst>
               <a:ext uri="{BEBA8EAE-BF5A-486C-A8C5-ECC9F3942E4B}">
                 <a14:imgProps xmlns:a14="http://schemas.microsoft.com/office/drawing/2010/main">
-                  <a14:imgLayer r:embed="rId12">
+                  <a14:imgLayer r:embed="rId14">
                     <a14:imgEffect>
                       <a14:backgroundRemoval t="2400" b="99400" l="30240" r="69760">
                         <a14:foregroundMark x1="59440" y1="36600" x2="60160" y2="31400"/>
@@ -11065,11 +11038,52 @@
           </a:extLst>
         </p:spPr>
       </p:pic>
+      <p:pic>
+        <p:nvPicPr>
+          <p:cNvPr id="3" name="Recorded Sound">
+            <a:hlinkClick r:id="" action="ppaction://media"/>
+            <a:extLst>
+              <a:ext uri="{FF2B5EF4-FFF2-40B4-BE49-F238E27FC236}">
+                <a16:creationId xmlns:a16="http://schemas.microsoft.com/office/drawing/2014/main" id="{7AFA544E-B5B0-4E16-9BDB-396EB32C49EA}"/>
+              </a:ext>
+            </a:extLst>
+          </p:cNvPr>
+          <p:cNvPicPr>
+            <a:picLocks noChangeAspect="1"/>
+          </p:cNvPicPr>
+          <p:nvPr>
+            <a:audioFile r:link="rId2"/>
+            <p:extLst>
+              <p:ext uri="{DAA4B4D4-6D71-4841-9C94-3DE7FCFB9230}">
+                <p14:media xmlns:p14="http://schemas.microsoft.com/office/powerpoint/2010/main" r:embed="rId1"/>
+              </p:ext>
+            </p:extLst>
+          </p:nvPr>
+        </p:nvPicPr>
+        <p:blipFill>
+          <a:blip r:embed="rId15"/>
+          <a:stretch>
+            <a:fillRect/>
+          </a:stretch>
+        </p:blipFill>
+        <p:spPr>
+          <a:xfrm>
+            <a:off x="7821038" y="4293635"/>
+            <a:ext cx="609600" cy="609600"/>
+          </a:xfrm>
+          <a:prstGeom prst="rect">
+            <a:avLst/>
+          </a:prstGeom>
+        </p:spPr>
+      </p:pic>
     </p:spTree>
   </p:cSld>
   <p:clrMapOvr>
     <a:masterClrMapping/>
   </p:clrMapOvr>
+  <p:transition advClick="0">
+    <p:fade thruBlk="1"/>
+  </p:transition>
   <p:timing>
     <p:tnLst>
       <p:par>
@@ -11082,6 +11096,9 @@
                     <p:cTn id="3" fill="hold">
                       <p:stCondLst>
                         <p:cond delay="indefinite"/>
+                        <p:cond evt="onBegin" delay="0">
+                          <p:tn val="2"/>
+                        </p:cond>
                       </p:stCondLst>
                       <p:childTnLst>
                         <p:par>
@@ -11091,14 +11108,49 @@
                             </p:stCondLst>
                             <p:childTnLst>
                               <p:par>
-                                <p:cTn id="5" presetID="10" presetClass="entr" presetSubtype="0" fill="hold" nodeType="clickEffect">
+                                <p:cTn id="5" presetID="1" presetClass="mediacall" presetSubtype="0" fill="hold" nodeType="afterEffect">
+                                  <p:stCondLst>
+                                    <p:cond delay="0"/>
+                                  </p:stCondLst>
+                                  <p:childTnLst>
+                                    <p:cmd type="call" cmd="playFrom(0.0)">
+                                      <p:cBhvr>
+                                        <p:cTn id="6" dur="1" fill="hold"/>
+                                        <p:tgtEl>
+                                          <p:spTgt spid="3"/>
+                                        </p:tgtEl>
+                                      </p:cBhvr>
+                                    </p:cmd>
+                                  </p:childTnLst>
+                                </p:cTn>
+                              </p:par>
+                            </p:childTnLst>
+                          </p:cTn>
+                        </p:par>
+                      </p:childTnLst>
+                    </p:cTn>
+                  </p:par>
+                  <p:par>
+                    <p:cTn id="7" fill="hold">
+                      <p:stCondLst>
+                        <p:cond delay="indefinite"/>
+                      </p:stCondLst>
+                      <p:childTnLst>
+                        <p:par>
+                          <p:cTn id="8" fill="hold">
+                            <p:stCondLst>
+                              <p:cond delay="0"/>
+                            </p:stCondLst>
+                            <p:childTnLst>
+                              <p:par>
+                                <p:cTn id="9" presetID="10" presetClass="entr" presetSubtype="0" fill="hold" nodeType="clickEffect">
                                   <p:stCondLst>
                                     <p:cond delay="0"/>
                                   </p:stCondLst>
                                   <p:childTnLst>
                                     <p:set>
                                       <p:cBhvr>
-                                        <p:cTn id="6" dur="1" fill="hold">
+                                        <p:cTn id="10" dur="1" fill="hold">
                                           <p:stCondLst>
                                             <p:cond delay="0"/>
                                           </p:stCondLst>
@@ -11116,7 +11168,7 @@
                                     </p:set>
                                     <p:animEffect transition="in" filter="fade">
                                       <p:cBhvr>
-                                        <p:cTn id="7" dur="500"/>
+                                        <p:cTn id="11" dur="500"/>
                                         <p:tgtEl>
                                           <p:spTgt spid="1044"/>
                                         </p:tgtEl>
@@ -11132,26 +11184,26 @@
                     </p:cTn>
                   </p:par>
                   <p:par>
-                    <p:cTn id="8" fill="hold">
+                    <p:cTn id="12" fill="hold">
                       <p:stCondLst>
                         <p:cond delay="indefinite"/>
                       </p:stCondLst>
                       <p:childTnLst>
                         <p:par>
-                          <p:cTn id="9" fill="hold">
+                          <p:cTn id="13" fill="hold">
                             <p:stCondLst>
                               <p:cond delay="0"/>
                             </p:stCondLst>
                             <p:childTnLst>
                               <p:par>
-                                <p:cTn id="10" presetID="10" presetClass="entr" presetSubtype="0" fill="hold" nodeType="clickEffect">
+                                <p:cTn id="14" presetID="10" presetClass="entr" presetSubtype="0" fill="hold" nodeType="clickEffect">
                                   <p:stCondLst>
                                     <p:cond delay="0"/>
                                   </p:stCondLst>
                                   <p:childTnLst>
                                     <p:set>
                                       <p:cBhvr>
-                                        <p:cTn id="11" dur="1" fill="hold">
+                                        <p:cTn id="15" dur="1" fill="hold">
                                           <p:stCondLst>
                                             <p:cond delay="0"/>
                                           </p:stCondLst>
@@ -11169,7 +11221,7 @@
                                     </p:set>
                                     <p:animEffect transition="in" filter="fade">
                                       <p:cBhvr>
-                                        <p:cTn id="12" dur="500"/>
+                                        <p:cTn id="16" dur="500"/>
                                         <p:tgtEl>
                                           <p:spTgt spid="1038"/>
                                         </p:tgtEl>
@@ -11185,26 +11237,26 @@
                     </p:cTn>
                   </p:par>
                   <p:par>
-                    <p:cTn id="13" fill="hold">
+                    <p:cTn id="17" fill="hold">
                       <p:stCondLst>
                         <p:cond delay="indefinite"/>
                       </p:stCondLst>
                       <p:childTnLst>
                         <p:par>
-                          <p:cTn id="14" fill="hold">
+                          <p:cTn id="18" fill="hold">
                             <p:stCondLst>
                               <p:cond delay="0"/>
                             </p:stCondLst>
                             <p:childTnLst>
                               <p:par>
-                                <p:cTn id="15" presetID="10" presetClass="entr" presetSubtype="0" fill="hold" nodeType="clickEffect">
+                                <p:cTn id="19" presetID="10" presetClass="entr" presetSubtype="0" fill="hold" nodeType="clickEffect">
                                   <p:stCondLst>
                                     <p:cond delay="0"/>
                                   </p:stCondLst>
                                   <p:childTnLst>
                                     <p:set>
                                       <p:cBhvr>
-                                        <p:cTn id="16" dur="1" fill="hold">
+                                        <p:cTn id="20" dur="1" fill="hold">
                                           <p:stCondLst>
                                             <p:cond delay="0"/>
                                           </p:stCondLst>
@@ -11222,7 +11274,7 @@
                                     </p:set>
                                     <p:animEffect transition="in" filter="fade">
                                       <p:cBhvr>
-                                        <p:cTn id="17" dur="500"/>
+                                        <p:cTn id="21" dur="500"/>
                                         <p:tgtEl>
                                           <p:spTgt spid="1034"/>
                                         </p:tgtEl>
@@ -11238,26 +11290,26 @@
                     </p:cTn>
                   </p:par>
                   <p:par>
-                    <p:cTn id="18" fill="hold">
+                    <p:cTn id="22" fill="hold">
                       <p:stCondLst>
                         <p:cond delay="indefinite"/>
                       </p:stCondLst>
                       <p:childTnLst>
                         <p:par>
-                          <p:cTn id="19" fill="hold">
+                          <p:cTn id="23" fill="hold">
                             <p:stCondLst>
                               <p:cond delay="0"/>
                             </p:stCondLst>
                             <p:childTnLst>
                               <p:par>
-                                <p:cTn id="20" presetID="10" presetClass="entr" presetSubtype="0" fill="hold" nodeType="clickEffect">
+                                <p:cTn id="24" presetID="10" presetClass="entr" presetSubtype="0" fill="hold" nodeType="clickEffect">
                                   <p:stCondLst>
                                     <p:cond delay="0"/>
                                   </p:stCondLst>
                                   <p:childTnLst>
                                     <p:set>
                                       <p:cBhvr>
-                                        <p:cTn id="21" dur="1" fill="hold">
+                                        <p:cTn id="25" dur="1" fill="hold">
                                           <p:stCondLst>
                                             <p:cond delay="0"/>
                                           </p:stCondLst>
@@ -11275,7 +11327,7 @@
                                     </p:set>
                                     <p:animEffect transition="in" filter="fade">
                                       <p:cBhvr>
-                                        <p:cTn id="22" dur="500"/>
+                                        <p:cTn id="26" dur="500"/>
                                         <p:tgtEl>
                                           <p:spTgt spid="1048"/>
                                         </p:tgtEl>
@@ -11291,26 +11343,26 @@
                     </p:cTn>
                   </p:par>
                   <p:par>
-                    <p:cTn id="23" fill="hold">
+                    <p:cTn id="27" fill="hold">
                       <p:stCondLst>
                         <p:cond delay="indefinite"/>
                       </p:stCondLst>
                       <p:childTnLst>
                         <p:par>
-                          <p:cTn id="24" fill="hold">
+                          <p:cTn id="28" fill="hold">
                             <p:stCondLst>
                               <p:cond delay="0"/>
                             </p:stCondLst>
                             <p:childTnLst>
                               <p:par>
-                                <p:cTn id="25" presetID="10" presetClass="entr" presetSubtype="0" fill="hold" nodeType="clickEffect">
+                                <p:cTn id="29" presetID="10" presetClass="entr" presetSubtype="0" fill="hold" nodeType="clickEffect">
                                   <p:stCondLst>
                                     <p:cond delay="0"/>
                                   </p:stCondLst>
                                   <p:childTnLst>
                                     <p:set>
                                       <p:cBhvr>
-                                        <p:cTn id="26" dur="1" fill="hold">
+                                        <p:cTn id="30" dur="1" fill="hold">
                                           <p:stCondLst>
                                             <p:cond delay="0"/>
                                           </p:stCondLst>
@@ -11328,7 +11380,7 @@
                                     </p:set>
                                     <p:animEffect transition="in" filter="fade">
                                       <p:cBhvr>
-                                        <p:cTn id="27" dur="500"/>
+                                        <p:cTn id="31" dur="500"/>
                                         <p:tgtEl>
                                           <p:spTgt spid="1042"/>
                                         </p:tgtEl>
@@ -11344,26 +11396,26 @@
                     </p:cTn>
                   </p:par>
                   <p:par>
-                    <p:cTn id="28" fill="hold">
+                    <p:cTn id="32" fill="hold">
                       <p:stCondLst>
                         <p:cond delay="indefinite"/>
                       </p:stCondLst>
                       <p:childTnLst>
                         <p:par>
-                          <p:cTn id="29" fill="hold">
+                          <p:cTn id="33" fill="hold">
                             <p:stCondLst>
                               <p:cond delay="0"/>
                             </p:stCondLst>
                             <p:childTnLst>
                               <p:par>
-                                <p:cTn id="30" presetID="10" presetClass="entr" presetSubtype="0" fill="hold" nodeType="clickEffect">
+                                <p:cTn id="34" presetID="10" presetClass="entr" presetSubtype="0" fill="hold" nodeType="clickEffect">
                                   <p:stCondLst>
                                     <p:cond delay="0"/>
                                   </p:stCondLst>
                                   <p:childTnLst>
                                     <p:set>
                                       <p:cBhvr>
-                                        <p:cTn id="31" dur="1" fill="hold">
+                                        <p:cTn id="35" dur="1" fill="hold">
                                           <p:stCondLst>
                                             <p:cond delay="0"/>
                                           </p:stCondLst>
@@ -11381,7 +11433,7 @@
                                     </p:set>
                                     <p:animEffect transition="in" filter="fade">
                                       <p:cBhvr>
-                                        <p:cTn id="32" dur="500"/>
+                                        <p:cTn id="36" dur="500"/>
                                         <p:tgtEl>
                                           <p:spTgt spid="1028"/>
                                         </p:tgtEl>
@@ -11397,26 +11449,26 @@
                     </p:cTn>
                   </p:par>
                   <p:par>
-                    <p:cTn id="33" fill="hold">
+                    <p:cTn id="37" fill="hold">
                       <p:stCondLst>
                         <p:cond delay="indefinite"/>
                       </p:stCondLst>
                       <p:childTnLst>
                         <p:par>
-                          <p:cTn id="34" fill="hold">
+                          <p:cTn id="38" fill="hold">
                             <p:stCondLst>
                               <p:cond delay="0"/>
                             </p:stCondLst>
                             <p:childTnLst>
                               <p:par>
-                                <p:cTn id="35" presetID="10" presetClass="entr" presetSubtype="0" fill="hold" nodeType="clickEffect">
+                                <p:cTn id="39" presetID="10" presetClass="entr" presetSubtype="0" fill="hold" nodeType="clickEffect">
                                   <p:stCondLst>
                                     <p:cond delay="0"/>
                                   </p:stCondLst>
                                   <p:childTnLst>
                                     <p:set>
                                       <p:cBhvr>
-                                        <p:cTn id="36" dur="1" fill="hold">
+                                        <p:cTn id="40" dur="1" fill="hold">
                                           <p:stCondLst>
                                             <p:cond delay="0"/>
                                           </p:stCondLst>
@@ -11434,7 +11486,7 @@
                                     </p:set>
                                     <p:animEffect transition="in" filter="fade">
                                       <p:cBhvr>
-                                        <p:cTn id="37" dur="500"/>
+                                        <p:cTn id="41" dur="500"/>
                                         <p:tgtEl>
                                           <p:spTgt spid="1040"/>
                                         </p:tgtEl>
@@ -11450,26 +11502,26 @@
                     </p:cTn>
                   </p:par>
                   <p:par>
-                    <p:cTn id="38" fill="hold">
+                    <p:cTn id="42" fill="hold">
                       <p:stCondLst>
                         <p:cond delay="indefinite"/>
                       </p:stCondLst>
                       <p:childTnLst>
                         <p:par>
-                          <p:cTn id="39" fill="hold">
+                          <p:cTn id="43" fill="hold">
                             <p:stCondLst>
                               <p:cond delay="0"/>
                             </p:stCondLst>
                             <p:childTnLst>
                               <p:par>
-                                <p:cTn id="40" presetID="10" presetClass="entr" presetSubtype="0" fill="hold" nodeType="clickEffect">
+                                <p:cTn id="44" presetID="10" presetClass="entr" presetSubtype="0" fill="hold" nodeType="clickEffect">
                                   <p:stCondLst>
                                     <p:cond delay="0"/>
                                   </p:stCondLst>
                                   <p:childTnLst>
                                     <p:set>
                                       <p:cBhvr>
-                                        <p:cTn id="41" dur="1" fill="hold">
+                                        <p:cTn id="45" dur="1" fill="hold">
                                           <p:stCondLst>
                                             <p:cond delay="0"/>
                                           </p:stCondLst>
@@ -11487,7 +11539,7 @@
                                     </p:set>
                                     <p:animEffect transition="in" filter="fade">
                                       <p:cBhvr>
-                                        <p:cTn id="42" dur="500"/>
+                                        <p:cTn id="46" dur="500"/>
                                         <p:tgtEl>
                                           <p:spTgt spid="1030"/>
                                         </p:tgtEl>
@@ -11503,26 +11555,26 @@
                     </p:cTn>
                   </p:par>
                   <p:par>
-                    <p:cTn id="43" fill="hold">
+                    <p:cTn id="47" fill="hold">
                       <p:stCondLst>
                         <p:cond delay="indefinite"/>
                       </p:stCondLst>
                       <p:childTnLst>
                         <p:par>
-                          <p:cTn id="44" fill="hold">
+                          <p:cTn id="48" fill="hold">
                             <p:stCondLst>
                               <p:cond delay="0"/>
                             </p:stCondLst>
                             <p:childTnLst>
                               <p:par>
-                                <p:cTn id="45" presetID="10" presetClass="entr" presetSubtype="0" fill="hold" nodeType="clickEffect">
+                                <p:cTn id="49" presetID="10" presetClass="entr" presetSubtype="0" fill="hold" nodeType="clickEffect">
                                   <p:stCondLst>
                                     <p:cond delay="0"/>
                                   </p:stCondLst>
                                   <p:childTnLst>
                                     <p:set>
                                       <p:cBhvr>
-                                        <p:cTn id="46" dur="1" fill="hold">
+                                        <p:cTn id="50" dur="1" fill="hold">
                                           <p:stCondLst>
                                             <p:cond delay="0"/>
                                           </p:stCondLst>
@@ -11540,7 +11592,7 @@
                                     </p:set>
                                     <p:animEffect transition="in" filter="fade">
                                       <p:cBhvr>
-                                        <p:cTn id="47" dur="500"/>
+                                        <p:cTn id="51" dur="500"/>
                                         <p:tgtEl>
                                           <p:spTgt spid="1026"/>
                                         </p:tgtEl>
@@ -11572,6 +11624,25 @@
                 </p:cond>
               </p:nextCondLst>
             </p:seq>
+            <p:audio>
+              <p:cMediaNode vol="80000" numSld="999" showWhenStopped="0">
+                <p:cTn id="52" repeatCount="indefinite" fill="hold" display="0">
+                  <p:stCondLst>
+                    <p:cond delay="indefinite"/>
+                  </p:stCondLst>
+                  <p:endCondLst>
+                    <p:cond evt="onStopAudio" delay="0">
+                      <p:tgtEl>
+                        <p:sldTgt/>
+                      </p:tgtEl>
+                    </p:cond>
+                  </p:endCondLst>
+                </p:cTn>
+                <p:tgtEl>
+                  <p:spTgt spid="3"/>
+                </p:tgtEl>
+              </p:cMediaNode>
+            </p:audio>
           </p:childTnLst>
         </p:cTn>
       </p:par>
@@ -13319,6 +13390,44 @@
           </p:txBody>
         </p:sp>
       </p:grpSp>
+      <p:pic>
+        <p:nvPicPr>
+          <p:cNvPr id="10" name="Recorded Sound">
+            <a:hlinkClick r:id="" action="ppaction://media"/>
+            <a:extLst>
+              <a:ext uri="{FF2B5EF4-FFF2-40B4-BE49-F238E27FC236}">
+                <a16:creationId xmlns:a16="http://schemas.microsoft.com/office/drawing/2014/main" id="{68B52409-49D6-4C41-AB9F-F1A419D234A7}"/>
+              </a:ext>
+            </a:extLst>
+          </p:cNvPr>
+          <p:cNvPicPr>
+            <a:picLocks noChangeAspect="1"/>
+          </p:cNvPicPr>
+          <p:nvPr>
+            <a:audioFile r:link="rId2"/>
+            <p:extLst>
+              <p:ext uri="{DAA4B4D4-6D71-4841-9C94-3DE7FCFB9230}">
+                <p14:media xmlns:p14="http://schemas.microsoft.com/office/powerpoint/2010/main" r:embed="rId1"/>
+              </p:ext>
+            </p:extLst>
+          </p:nvPr>
+        </p:nvPicPr>
+        <p:blipFill>
+          <a:blip r:embed="rId5"/>
+          <a:stretch>
+            <a:fillRect/>
+          </a:stretch>
+        </p:blipFill>
+        <p:spPr>
+          <a:xfrm>
+            <a:off x="8151779" y="4288654"/>
+            <a:ext cx="609600" cy="609600"/>
+          </a:xfrm>
+          <a:prstGeom prst="rect">
+            <a:avLst/>
+          </a:prstGeom>
+        </p:spPr>
+      </p:pic>
     </p:spTree>
   </p:cSld>
   <p:clrMapOvr>
@@ -13336,6 +13445,9 @@
                     <p:cTn id="3" fill="hold">
                       <p:stCondLst>
                         <p:cond delay="indefinite"/>
+                        <p:cond evt="onBegin" delay="0">
+                          <p:tn val="2"/>
+                        </p:cond>
                       </p:stCondLst>
                       <p:childTnLst>
                         <p:par>
@@ -13345,14 +13457,49 @@
                             </p:stCondLst>
                             <p:childTnLst>
                               <p:par>
-                                <p:cTn id="5" presetID="10" presetClass="entr" presetSubtype="0" fill="hold" nodeType="clickEffect">
+                                <p:cTn id="5" presetID="1" presetClass="mediacall" presetSubtype="0" fill="hold" nodeType="afterEffect">
+                                  <p:stCondLst>
+                                    <p:cond delay="0"/>
+                                  </p:stCondLst>
+                                  <p:childTnLst>
+                                    <p:cmd type="call" cmd="playFrom(0.0)">
+                                      <p:cBhvr>
+                                        <p:cTn id="6" dur="1" fill="hold"/>
+                                        <p:tgtEl>
+                                          <p:spTgt spid="10"/>
+                                        </p:tgtEl>
+                                      </p:cBhvr>
+                                    </p:cmd>
+                                  </p:childTnLst>
+                                </p:cTn>
+                              </p:par>
+                            </p:childTnLst>
+                          </p:cTn>
+                        </p:par>
+                      </p:childTnLst>
+                    </p:cTn>
+                  </p:par>
+                  <p:par>
+                    <p:cTn id="7" fill="hold">
+                      <p:stCondLst>
+                        <p:cond delay="indefinite"/>
+                      </p:stCondLst>
+                      <p:childTnLst>
+                        <p:par>
+                          <p:cTn id="8" fill="hold">
+                            <p:stCondLst>
+                              <p:cond delay="0"/>
+                            </p:stCondLst>
+                            <p:childTnLst>
+                              <p:par>
+                                <p:cTn id="9" presetID="10" presetClass="entr" presetSubtype="0" fill="hold" nodeType="clickEffect">
                                   <p:stCondLst>
                                     <p:cond delay="0"/>
                                   </p:stCondLst>
                                   <p:childTnLst>
                                     <p:set>
                                       <p:cBhvr>
-                                        <p:cTn id="6" dur="1" fill="hold">
+                                        <p:cTn id="10" dur="1" fill="hold">
                                           <p:stCondLst>
                                             <p:cond delay="0"/>
                                           </p:stCondLst>
@@ -13370,7 +13517,7 @@
                                     </p:set>
                                     <p:animEffect transition="in" filter="fade">
                                       <p:cBhvr>
-                                        <p:cTn id="7" dur="500"/>
+                                        <p:cTn id="11" dur="500"/>
                                         <p:tgtEl>
                                           <p:spTgt spid="4"/>
                                         </p:tgtEl>
@@ -13386,26 +13533,26 @@
                     </p:cTn>
                   </p:par>
                   <p:par>
-                    <p:cTn id="8" fill="hold">
+                    <p:cTn id="12" fill="hold">
                       <p:stCondLst>
                         <p:cond delay="indefinite"/>
                       </p:stCondLst>
                       <p:childTnLst>
                         <p:par>
-                          <p:cTn id="9" fill="hold">
+                          <p:cTn id="13" fill="hold">
                             <p:stCondLst>
                               <p:cond delay="0"/>
                             </p:stCondLst>
                             <p:childTnLst>
                               <p:par>
-                                <p:cTn id="10" presetID="10" presetClass="entr" presetSubtype="0" fill="hold" nodeType="clickEffect">
+                                <p:cTn id="14" presetID="10" presetClass="entr" presetSubtype="0" fill="hold" nodeType="clickEffect">
                                   <p:stCondLst>
                                     <p:cond delay="0"/>
                                   </p:stCondLst>
                                   <p:childTnLst>
                                     <p:set>
                                       <p:cBhvr>
-                                        <p:cTn id="11" dur="1" fill="hold">
+                                        <p:cTn id="15" dur="1" fill="hold">
                                           <p:stCondLst>
                                             <p:cond delay="0"/>
                                           </p:stCondLst>
@@ -13423,7 +13570,7 @@
                                     </p:set>
                                     <p:animEffect transition="in" filter="fade">
                                       <p:cBhvr>
-                                        <p:cTn id="12" dur="500"/>
+                                        <p:cTn id="16" dur="500"/>
                                         <p:tgtEl>
                                           <p:spTgt spid="9"/>
                                         </p:tgtEl>
@@ -13439,26 +13586,26 @@
                     </p:cTn>
                   </p:par>
                   <p:par>
-                    <p:cTn id="13" fill="hold">
+                    <p:cTn id="17" fill="hold">
                       <p:stCondLst>
                         <p:cond delay="indefinite"/>
                       </p:stCondLst>
                       <p:childTnLst>
                         <p:par>
-                          <p:cTn id="14" fill="hold">
+                          <p:cTn id="18" fill="hold">
                             <p:stCondLst>
                               <p:cond delay="0"/>
                             </p:stCondLst>
                             <p:childTnLst>
                               <p:par>
-                                <p:cTn id="15" presetID="10" presetClass="entr" presetSubtype="0" fill="hold" nodeType="clickEffect">
+                                <p:cTn id="19" presetID="10" presetClass="entr" presetSubtype="0" fill="hold" nodeType="clickEffect">
                                   <p:stCondLst>
                                     <p:cond delay="0"/>
                                   </p:stCondLst>
                                   <p:childTnLst>
                                     <p:set>
                                       <p:cBhvr>
-                                        <p:cTn id="16" dur="1" fill="hold">
+                                        <p:cTn id="20" dur="1" fill="hold">
                                           <p:stCondLst>
                                             <p:cond delay="0"/>
                                           </p:stCondLst>
@@ -13476,7 +13623,7 @@
                                     </p:set>
                                     <p:animEffect transition="in" filter="fade">
                                       <p:cBhvr>
-                                        <p:cTn id="17" dur="500"/>
+                                        <p:cTn id="21" dur="500"/>
                                         <p:tgtEl>
                                           <p:spTgt spid="5"/>
                                         </p:tgtEl>
@@ -13492,26 +13639,26 @@
                     </p:cTn>
                   </p:par>
                   <p:par>
-                    <p:cTn id="18" fill="hold">
+                    <p:cTn id="22" fill="hold">
                       <p:stCondLst>
                         <p:cond delay="indefinite"/>
                       </p:stCondLst>
                       <p:childTnLst>
                         <p:par>
-                          <p:cTn id="19" fill="hold">
+                          <p:cTn id="23" fill="hold">
                             <p:stCondLst>
                               <p:cond delay="0"/>
                             </p:stCondLst>
                             <p:childTnLst>
                               <p:par>
-                                <p:cTn id="20" presetID="10" presetClass="entr" presetSubtype="0" fill="hold" nodeType="clickEffect">
+                                <p:cTn id="24" presetID="10" presetClass="entr" presetSubtype="0" fill="hold" nodeType="clickEffect">
                                   <p:stCondLst>
                                     <p:cond delay="0"/>
                                   </p:stCondLst>
                                   <p:childTnLst>
                                     <p:set>
                                       <p:cBhvr>
-                                        <p:cTn id="21" dur="1" fill="hold">
+                                        <p:cTn id="25" dur="1" fill="hold">
                                           <p:stCondLst>
                                             <p:cond delay="0"/>
                                           </p:stCondLst>
@@ -13529,7 +13676,7 @@
                                     </p:set>
                                     <p:animEffect transition="in" filter="fade">
                                       <p:cBhvr>
-                                        <p:cTn id="22" dur="500"/>
+                                        <p:cTn id="26" dur="500"/>
                                         <p:tgtEl>
                                           <p:spTgt spid="8"/>
                                         </p:tgtEl>
@@ -13545,26 +13692,26 @@
                     </p:cTn>
                   </p:par>
                   <p:par>
-                    <p:cTn id="23" fill="hold">
+                    <p:cTn id="27" fill="hold">
                       <p:stCondLst>
                         <p:cond delay="indefinite"/>
                       </p:stCondLst>
                       <p:childTnLst>
                         <p:par>
-                          <p:cTn id="24" fill="hold">
+                          <p:cTn id="28" fill="hold">
                             <p:stCondLst>
                               <p:cond delay="0"/>
                             </p:stCondLst>
                             <p:childTnLst>
                               <p:par>
-                                <p:cTn id="25" presetID="10" presetClass="entr" presetSubtype="0" fill="hold" nodeType="clickEffect">
+                                <p:cTn id="29" presetID="10" presetClass="entr" presetSubtype="0" fill="hold" nodeType="clickEffect">
                                   <p:stCondLst>
                                     <p:cond delay="0"/>
                                   </p:stCondLst>
                                   <p:childTnLst>
                                     <p:set>
                                       <p:cBhvr>
-                                        <p:cTn id="26" dur="1" fill="hold">
+                                        <p:cTn id="30" dur="1" fill="hold">
                                           <p:stCondLst>
                                             <p:cond delay="0"/>
                                           </p:stCondLst>
@@ -13582,7 +13729,7 @@
                                     </p:set>
                                     <p:animEffect transition="in" filter="fade">
                                       <p:cBhvr>
-                                        <p:cTn id="27" dur="500"/>
+                                        <p:cTn id="31" dur="500"/>
                                         <p:tgtEl>
                                           <p:spTgt spid="6"/>
                                         </p:tgtEl>
@@ -13598,26 +13745,26 @@
                     </p:cTn>
                   </p:par>
                   <p:par>
-                    <p:cTn id="28" fill="hold">
+                    <p:cTn id="32" fill="hold">
                       <p:stCondLst>
                         <p:cond delay="indefinite"/>
                       </p:stCondLst>
                       <p:childTnLst>
                         <p:par>
-                          <p:cTn id="29" fill="hold">
+                          <p:cTn id="33" fill="hold">
                             <p:stCondLst>
                               <p:cond delay="0"/>
                             </p:stCondLst>
                             <p:childTnLst>
                               <p:par>
-                                <p:cTn id="30" presetID="10" presetClass="entr" presetSubtype="0" fill="hold" nodeType="clickEffect">
+                                <p:cTn id="34" presetID="10" presetClass="entr" presetSubtype="0" fill="hold" nodeType="clickEffect">
                                   <p:stCondLst>
                                     <p:cond delay="0"/>
                                   </p:stCondLst>
                                   <p:childTnLst>
                                     <p:set>
                                       <p:cBhvr>
-                                        <p:cTn id="31" dur="1" fill="hold">
+                                        <p:cTn id="35" dur="1" fill="hold">
                                           <p:stCondLst>
                                             <p:cond delay="0"/>
                                           </p:stCondLst>
@@ -13635,7 +13782,7 @@
                                     </p:set>
                                     <p:animEffect transition="in" filter="fade">
                                       <p:cBhvr>
-                                        <p:cTn id="32" dur="500"/>
+                                        <p:cTn id="36" dur="500"/>
                                         <p:tgtEl>
                                           <p:spTgt spid="7"/>
                                         </p:tgtEl>
@@ -13667,6 +13814,25 @@
                 </p:cond>
               </p:nextCondLst>
             </p:seq>
+            <p:audio>
+              <p:cMediaNode vol="80000" numSld="999" showWhenStopped="0">
+                <p:cTn id="37" repeatCount="indefinite" fill="hold" display="0">
+                  <p:stCondLst>
+                    <p:cond delay="indefinite"/>
+                  </p:stCondLst>
+                  <p:endCondLst>
+                    <p:cond evt="onStopAudio" delay="0">
+                      <p:tgtEl>
+                        <p:sldTgt/>
+                      </p:tgtEl>
+                    </p:cond>
+                  </p:endCondLst>
+                </p:cTn>
+                <p:tgtEl>
+                  <p:spTgt spid="10"/>
+                </p:tgtEl>
+              </p:cMediaNode>
+            </p:audio>
           </p:childTnLst>
         </p:cTn>
       </p:par>
@@ -14300,13 +14466,6 @@
   <p:clrMapOvr>
     <a:masterClrMapping/>
   </p:clrMapOvr>
-  <p:timing>
-    <p:tnLst>
-      <p:par>
-        <p:cTn id="1" dur="indefinite" restart="never" nodeType="tmRoot"/>
-      </p:par>
-    </p:tnLst>
-  </p:timing>
 </p:sld>
 </file>
 

</xml_diff>